<commit_message>
La auditoria en informática y su entorno
</commit_message>
<xml_diff>
--- a/La auditoria en informática y su entorno.pptx
+++ b/La auditoria en informática y su entorno.pptx
@@ -2,11 +2,14 @@
 <file path=ppt/presentation.xml><?xml version="1.0" encoding="utf-8"?>
 <p:presentation xmlns:a="http://schemas.openxmlformats.org/drawingml/2006/main" xmlns:r="http://schemas.openxmlformats.org/officeDocument/2006/relationships" xmlns:p="http://schemas.openxmlformats.org/presentationml/2006/main" saveSubsetFonts="1">
   <p:sldMasterIdLst>
-    <p:sldMasterId id="2147483660" r:id="rId1"/>
+    <p:sldMasterId id="2147483672" r:id="rId1"/>
   </p:sldMasterIdLst>
   <p:sldIdLst>
     <p:sldId id="256" r:id="rId2"/>
     <p:sldId id="257" r:id="rId3"/>
+    <p:sldId id="258" r:id="rId4"/>
+    <p:sldId id="261" r:id="rId5"/>
+    <p:sldId id="260" r:id="rId6"/>
   </p:sldIdLst>
   <p:sldSz cx="9144000" cy="6858000" type="screen4x3"/>
   <p:notesSz cx="6858000" cy="9144000"/>
@@ -13379,17 +13382,17 @@
   </p:cSld>
   <p:clrMap bg1="lt1" tx1="dk1" bg2="lt2" tx2="dk2" accent1="accent1" accent2="accent2" accent3="accent3" accent4="accent4" accent5="accent5" accent6="accent6" hlink="hlink" folHlink="folHlink"/>
   <p:sldLayoutIdLst>
-    <p:sldLayoutId id="2147483661" r:id="rId1"/>
-    <p:sldLayoutId id="2147483662" r:id="rId2"/>
-    <p:sldLayoutId id="2147483663" r:id="rId3"/>
-    <p:sldLayoutId id="2147483664" r:id="rId4"/>
-    <p:sldLayoutId id="2147483665" r:id="rId5"/>
-    <p:sldLayoutId id="2147483666" r:id="rId6"/>
-    <p:sldLayoutId id="2147483667" r:id="rId7"/>
-    <p:sldLayoutId id="2147483668" r:id="rId8"/>
-    <p:sldLayoutId id="2147483669" r:id="rId9"/>
-    <p:sldLayoutId id="2147483670" r:id="rId10"/>
-    <p:sldLayoutId id="2147483671" r:id="rId11"/>
+    <p:sldLayoutId id="2147483673" r:id="rId1"/>
+    <p:sldLayoutId id="2147483674" r:id="rId2"/>
+    <p:sldLayoutId id="2147483675" r:id="rId3"/>
+    <p:sldLayoutId id="2147483676" r:id="rId4"/>
+    <p:sldLayoutId id="2147483677" r:id="rId5"/>
+    <p:sldLayoutId id="2147483678" r:id="rId6"/>
+    <p:sldLayoutId id="2147483679" r:id="rId7"/>
+    <p:sldLayoutId id="2147483680" r:id="rId8"/>
+    <p:sldLayoutId id="2147483681" r:id="rId9"/>
+    <p:sldLayoutId id="2147483682" r:id="rId10"/>
+    <p:sldLayoutId id="2147483683" r:id="rId11"/>
   </p:sldLayoutIdLst>
   <p:txStyles>
     <p:titleStyle>
@@ -13853,7 +13856,213 @@
       </p:grpSpPr>
       <p:sp>
         <p:nvSpPr>
-          <p:cNvPr id="2" name="1 Título"/>
+          <p:cNvPr id="3" name="2 Título"/>
+          <p:cNvSpPr>
+            <a:spLocks noGrp="1"/>
+          </p:cNvSpPr>
+          <p:nvPr>
+            <p:ph type="title"/>
+          </p:nvPr>
+        </p:nvSpPr>
+        <p:spPr/>
+        <p:txBody>
+          <a:bodyPr/>
+          <a:lstStyle/>
+          <a:p>
+            <a:r>
+              <a:rPr lang="es-MX" dirty="0" smtClean="0"/>
+              <a:t>El entorno en la informática</a:t>
+            </a:r>
+            <a:endParaRPr lang="es-MX" dirty="0"/>
+          </a:p>
+        </p:txBody>
+      </p:sp>
+      <p:sp>
+        <p:nvSpPr>
+          <p:cNvPr id="5" name="4 Marcador de contenido"/>
+          <p:cNvSpPr>
+            <a:spLocks noGrp="1"/>
+          </p:cNvSpPr>
+          <p:nvPr>
+            <p:ph idx="1"/>
+          </p:nvPr>
+        </p:nvSpPr>
+        <p:spPr/>
+        <p:txBody>
+          <a:bodyPr>
+            <a:normAutofit fontScale="70000" lnSpcReduction="20000"/>
+          </a:bodyPr>
+          <a:lstStyle/>
+          <a:p>
+            <a:r>
+              <a:rPr lang="es-MX" dirty="0"/>
+              <a:t>El equipo de auditoría informática debe poseer una adecuada referencia del entorno en el que va a desenvolverse.</a:t>
+            </a:r>
+          </a:p>
+          <a:p>
+            <a:r>
+              <a:rPr lang="es-MX" dirty="0"/>
+              <a:t>Este conocimiento previo se logra determinando, fundamentalmente, los siguientes extremos:</a:t>
+            </a:r>
+          </a:p>
+          <a:p>
+            <a:r>
+              <a:rPr lang="es-MX" dirty="0"/>
+              <a:t>Se determinará la ubicación geográfica de los distintos Centros de Proceso de Datos en la empresa. A continuación, se verificará la existencia de responsables en cada unos de ellos, así como el uso de los mismos estándares de trabajo.</a:t>
+            </a:r>
+          </a:p>
+          <a:p>
+            <a:r>
+              <a:rPr lang="es-MX" dirty="0"/>
+              <a:t>b) Arquitectura y configuración de Hardware y Software:</a:t>
+            </a:r>
+          </a:p>
+          <a:p>
+            <a:r>
+              <a:rPr lang="es-MX" dirty="0"/>
+              <a:t>Cuando existen varios equipos, es fundamental la configuración elegida para cada uno de ellos, ya que los mismos deben constituir un sistema compatible e intercomunicado. La configuración de los sistemas esta muy ligada a las políticas de seguridad lógica de las compañías</a:t>
+            </a:r>
+            <a:r>
+              <a:rPr lang="es-MX" dirty="0" smtClean="0"/>
+              <a:t>.</a:t>
+            </a:r>
+            <a:endParaRPr lang="es-MX" dirty="0"/>
+          </a:p>
+        </p:txBody>
+      </p:sp>
+    </p:spTree>
+    <p:extLst>
+      <p:ext uri="{BB962C8B-B14F-4D97-AF65-F5344CB8AC3E}">
+        <p14:creationId xmlns:p14="http://schemas.microsoft.com/office/powerpoint/2010/main" val="1534762223"/>
+      </p:ext>
+    </p:extLst>
+  </p:cSld>
+  <p:clrMapOvr>
+    <a:masterClrMapping/>
+  </p:clrMapOvr>
+</p:sld>
+</file>
+
+<file path=ppt/slides/slide3.xml><?xml version="1.0" encoding="utf-8"?>
+<p:sld xmlns:a="http://schemas.openxmlformats.org/drawingml/2006/main" xmlns:r="http://schemas.openxmlformats.org/officeDocument/2006/relationships" xmlns:p="http://schemas.openxmlformats.org/presentationml/2006/main">
+  <p:cSld>
+    <p:spTree>
+      <p:nvGrpSpPr>
+        <p:cNvPr id="1" name=""/>
+        <p:cNvGrpSpPr/>
+        <p:nvPr/>
+      </p:nvGrpSpPr>
+      <p:grpSpPr>
+        <a:xfrm>
+          <a:off x="0" y="0"/>
+          <a:ext cx="0" cy="0"/>
+          <a:chOff x="0" y="0"/>
+          <a:chExt cx="0" cy="0"/>
+        </a:xfrm>
+      </p:grpSpPr>
+      <p:sp>
+        <p:nvSpPr>
+          <p:cNvPr id="4" name="3 CuadroTexto"/>
+          <p:cNvSpPr txBox="1"/>
+          <p:nvPr/>
+        </p:nvSpPr>
+        <p:spPr>
+          <a:xfrm>
+            <a:off x="827584" y="1124744"/>
+            <a:ext cx="7488832" cy="4524315"/>
+          </a:xfrm>
+          <a:prstGeom prst="rect">
+            <a:avLst/>
+          </a:prstGeom>
+          <a:noFill/>
+        </p:spPr>
+        <p:txBody>
+          <a:bodyPr wrap="square" rtlCol="0">
+            <a:spAutoFit/>
+          </a:bodyPr>
+          <a:lstStyle/>
+          <a:p>
+            <a:r>
+              <a:rPr lang="es-MX" dirty="0"/>
+              <a:t>Los auditores, en su estudio inicial, deben tener en su poder la distribución e interconexión de los equipos.</a:t>
+            </a:r>
+          </a:p>
+          <a:p>
+            <a:r>
+              <a:rPr lang="es-MX" dirty="0"/>
+              <a:t>Situación geográfica de los Sistemas: El auditor recabará información escrita, en donde figuren todos los elementos físicos y lógicos de la instalación. En cuanto a Hardware figurarán las </a:t>
+            </a:r>
+            <a:r>
+              <a:rPr lang="es-MX" dirty="0" err="1"/>
+              <a:t>CPUs</a:t>
+            </a:r>
+            <a:r>
+              <a:rPr lang="es-MX" dirty="0"/>
+              <a:t>, unidades de control local y remotas, periféricos de todo tipo, etc.</a:t>
+            </a:r>
+          </a:p>
+          <a:p>
+            <a:r>
+              <a:rPr lang="es-MX" dirty="0"/>
+              <a:t>El inventario de software debe contener todos los productos lógicos del Sistema, desde el software básico hasta los programas de utilidad adquiridos o desarrollados internamente. Suele ser habitual clasificarlos en facturables y no facturables.</a:t>
+            </a:r>
+          </a:p>
+          <a:p>
+            <a:r>
+              <a:rPr lang="es-MX" dirty="0"/>
+              <a:t>d) Comunicación y Redes de Comunicación:</a:t>
+            </a:r>
+          </a:p>
+          <a:p>
+            <a:r>
+              <a:rPr lang="es-MX" dirty="0"/>
+              <a:t>En el estudio inicial los auditores dispondrán del número, situación y características principales de las líneas, así como de los accesos a la red pública de comunicaciones.</a:t>
+            </a:r>
+          </a:p>
+          <a:p>
+            <a:r>
+              <a:rPr lang="es-MX" dirty="0"/>
+              <a:t>Igualmente, poseerán información de las Redes Locales de la Empresa.</a:t>
+            </a:r>
+          </a:p>
+          <a:p>
+            <a:endParaRPr lang="es-MX" dirty="0"/>
+          </a:p>
+        </p:txBody>
+      </p:sp>
+    </p:spTree>
+    <p:extLst>
+      <p:ext uri="{BB962C8B-B14F-4D97-AF65-F5344CB8AC3E}">
+        <p14:creationId xmlns:p14="http://schemas.microsoft.com/office/powerpoint/2010/main" val="3136142775"/>
+      </p:ext>
+    </p:extLst>
+  </p:cSld>
+  <p:clrMapOvr>
+    <a:masterClrMapping/>
+  </p:clrMapOvr>
+</p:sld>
+</file>
+
+<file path=ppt/slides/slide4.xml><?xml version="1.0" encoding="utf-8"?>
+<p:sld xmlns:a="http://schemas.openxmlformats.org/drawingml/2006/main" xmlns:r="http://schemas.openxmlformats.org/officeDocument/2006/relationships" xmlns:p="http://schemas.openxmlformats.org/presentationml/2006/main">
+  <p:cSld>
+    <p:spTree>
+      <p:nvGrpSpPr>
+        <p:cNvPr id="1" name=""/>
+        <p:cNvGrpSpPr/>
+        <p:nvPr/>
+      </p:nvGrpSpPr>
+      <p:grpSpPr>
+        <a:xfrm>
+          <a:off x="0" y="0"/>
+          <a:ext cx="0" cy="0"/>
+          <a:chOff x="0" y="0"/>
+          <a:chExt cx="0" cy="0"/>
+        </a:xfrm>
+      </p:grpSpPr>
+      <p:sp>
+        <p:nvSpPr>
+          <p:cNvPr id="4" name="3 Título"/>
           <p:cNvSpPr>
             <a:spLocks noGrp="1"/>
           </p:cNvSpPr>
@@ -13864,378 +14073,167 @@
         <p:spPr/>
         <p:txBody>
           <a:bodyPr>
-            <a:normAutofit/>
+            <a:normAutofit fontScale="90000"/>
           </a:bodyPr>
           <a:lstStyle/>
           <a:p>
             <a:r>
-              <a:rPr lang="es-MX" sz="2000" dirty="0" smtClean="0">
-                <a:solidFill>
-                  <a:srgbClr val="FF0000"/>
-                </a:solidFill>
-              </a:rPr>
-              <a:t>Jesús Antonio ramos sauceda:</a:t>
+              <a:rPr lang="es-MX" dirty="0" smtClean="0"/>
+              <a:t>Objetivos de la auditoria informática</a:t>
             </a:r>
-            <a:r>
-              <a:rPr lang="es-MX" sz="2000" dirty="0" smtClean="0"/>
-              <a:t/>
-            </a:r>
-            <a:br>
-              <a:rPr lang="es-MX" sz="2000" dirty="0" smtClean="0"/>
-            </a:br>
-            <a:r>
-              <a:rPr lang="es-MX" sz="2000" dirty="0" smtClean="0"/>
-              <a:t>falta información.</a:t>
-            </a:r>
-            <a:endParaRPr lang="es-MX" sz="2000" dirty="0"/>
+            <a:endParaRPr lang="es-MX" dirty="0"/>
           </a:p>
         </p:txBody>
       </p:sp>
       <p:sp>
         <p:nvSpPr>
-          <p:cNvPr id="4" name="1 Título"/>
-          <p:cNvSpPr txBox="1">
-            <a:spLocks/>
+          <p:cNvPr id="3" name="2 Marcador de contenido"/>
+          <p:cNvSpPr>
+            <a:spLocks noGrp="1"/>
           </p:cNvSpPr>
-          <p:nvPr/>
+          <p:nvPr>
+            <p:ph idx="1"/>
+          </p:nvPr>
         </p:nvSpPr>
-        <p:spPr>
-          <a:xfrm>
-            <a:off x="1043608" y="2204864"/>
-            <a:ext cx="6888994" cy="836436"/>
-          </a:xfrm>
-          <a:prstGeom prst="rect">
-            <a:avLst/>
-          </a:prstGeom>
-        </p:spPr>
+        <p:spPr/>
         <p:txBody>
-          <a:bodyPr vert="horz" lIns="91440" tIns="45720" rIns="91440" bIns="45720" rtlCol="0" anchor="b">
-            <a:normAutofit fontScale="92500"/>
+          <a:bodyPr>
+            <a:normAutofit fontScale="85000" lnSpcReduction="10000"/>
           </a:bodyPr>
-          <a:lstStyle>
-            <a:lvl1pPr algn="l" defTabSz="914400" rtl="0" eaLnBrk="1" latinLnBrk="0" hangingPunct="1">
-              <a:spcBef>
-                <a:spcPct val="0"/>
-              </a:spcBef>
-              <a:buNone/>
-              <a:defRPr sz="4000" kern="1200">
-                <a:solidFill>
-                  <a:schemeClr val="accent1"/>
-                </a:solidFill>
-                <a:latin typeface="+mj-lt"/>
-                <a:ea typeface="+mj-ea"/>
-                <a:cs typeface="+mj-cs"/>
-              </a:defRPr>
-            </a:lvl1pPr>
-            <a:lvl2pPr eaLnBrk="1" hangingPunct="1">
-              <a:defRPr>
-                <a:solidFill>
-                  <a:schemeClr val="tx2"/>
-                </a:solidFill>
-              </a:defRPr>
-            </a:lvl2pPr>
-            <a:lvl3pPr eaLnBrk="1" hangingPunct="1">
-              <a:defRPr>
-                <a:solidFill>
-                  <a:schemeClr val="tx2"/>
-                </a:solidFill>
-              </a:defRPr>
-            </a:lvl3pPr>
-            <a:lvl4pPr eaLnBrk="1" hangingPunct="1">
-              <a:defRPr>
-                <a:solidFill>
-                  <a:schemeClr val="tx2"/>
-                </a:solidFill>
-              </a:defRPr>
-            </a:lvl4pPr>
-            <a:lvl5pPr eaLnBrk="1" hangingPunct="1">
-              <a:defRPr>
-                <a:solidFill>
-                  <a:schemeClr val="tx2"/>
-                </a:solidFill>
-              </a:defRPr>
-            </a:lvl5pPr>
-            <a:lvl6pPr eaLnBrk="1" hangingPunct="1">
-              <a:defRPr>
-                <a:solidFill>
-                  <a:schemeClr val="tx2"/>
-                </a:solidFill>
-              </a:defRPr>
-            </a:lvl6pPr>
-            <a:lvl7pPr eaLnBrk="1" hangingPunct="1">
-              <a:defRPr>
-                <a:solidFill>
-                  <a:schemeClr val="tx2"/>
-                </a:solidFill>
-              </a:defRPr>
-            </a:lvl7pPr>
-            <a:lvl8pPr eaLnBrk="1" hangingPunct="1">
-              <a:defRPr>
-                <a:solidFill>
-                  <a:schemeClr val="tx2"/>
-                </a:solidFill>
-              </a:defRPr>
-            </a:lvl8pPr>
-            <a:lvl9pPr eaLnBrk="1" hangingPunct="1">
-              <a:defRPr>
-                <a:solidFill>
-                  <a:schemeClr val="tx2"/>
-                </a:solidFill>
-              </a:defRPr>
-            </a:lvl9pPr>
-          </a:lstStyle>
+          <a:lstStyle/>
           <a:p>
             <a:r>
-              <a:rPr lang="es-MX" sz="2000" dirty="0" err="1" smtClean="0">
-                <a:solidFill>
-                  <a:srgbClr val="FF0000"/>
-                </a:solidFill>
-              </a:rPr>
-              <a:t>Hector</a:t>
-            </a:r>
-            <a:r>
-              <a:rPr lang="es-MX" sz="2000" dirty="0" smtClean="0">
-                <a:solidFill>
-                  <a:srgbClr val="FF0000"/>
-                </a:solidFill>
-              </a:rPr>
-              <a:t>: </a:t>
-            </a:r>
-            <a:r>
-              <a:rPr lang="es-MX" sz="2000" dirty="0" smtClean="0"/>
-              <a:t>hay que comenzar a investigar y poner información. </a:t>
-            </a:r>
-            <a:br>
-              <a:rPr lang="es-MX" sz="2000" dirty="0" smtClean="0"/>
-            </a:br>
-            <a:r>
-              <a:rPr lang="es-MX" sz="2000" dirty="0" smtClean="0">
-                <a:solidFill>
-                  <a:srgbClr val="FF0000"/>
-                </a:solidFill>
-              </a:rPr>
-              <a:t>Luis:</a:t>
-            </a:r>
-            <a:r>
-              <a:rPr lang="es-MX" sz="2000" dirty="0" smtClean="0"/>
-              <a:t> Creo que le falta un poco de información.</a:t>
-            </a:r>
-            <a:endParaRPr lang="es-MX" sz="2000" dirty="0"/>
-          </a:p>
-        </p:txBody>
-      </p:sp>
-      <p:sp>
-        <p:nvSpPr>
-          <p:cNvPr id="6" name="1 Título"/>
-          <p:cNvSpPr txBox="1">
-            <a:spLocks/>
-          </p:cNvSpPr>
-          <p:nvPr/>
-        </p:nvSpPr>
-        <p:spPr>
-          <a:xfrm>
-            <a:off x="1069295" y="3140968"/>
-            <a:ext cx="6888994" cy="2808312"/>
-          </a:xfrm>
-          <a:prstGeom prst="rect">
-            <a:avLst/>
-          </a:prstGeom>
-        </p:spPr>
-        <p:txBody>
-          <a:bodyPr vert="horz" lIns="91440" tIns="45720" rIns="91440" bIns="45720" rtlCol="0" anchor="b">
-            <a:normAutofit/>
-          </a:bodyPr>
-          <a:lstStyle>
-            <a:lvl1pPr algn="l" defTabSz="914400" rtl="0" eaLnBrk="1" latinLnBrk="0" hangingPunct="1">
-              <a:spcBef>
-                <a:spcPct val="0"/>
-              </a:spcBef>
-              <a:buNone/>
-              <a:defRPr sz="4000" kern="1200">
-                <a:solidFill>
-                  <a:schemeClr val="accent1"/>
-                </a:solidFill>
-                <a:latin typeface="+mj-lt"/>
-                <a:ea typeface="+mj-ea"/>
-                <a:cs typeface="+mj-cs"/>
-              </a:defRPr>
-            </a:lvl1pPr>
-            <a:lvl2pPr eaLnBrk="1" hangingPunct="1">
-              <a:defRPr>
-                <a:solidFill>
-                  <a:schemeClr val="tx2"/>
-                </a:solidFill>
-              </a:defRPr>
-            </a:lvl2pPr>
-            <a:lvl3pPr eaLnBrk="1" hangingPunct="1">
-              <a:defRPr>
-                <a:solidFill>
-                  <a:schemeClr val="tx2"/>
-                </a:solidFill>
-              </a:defRPr>
-            </a:lvl3pPr>
-            <a:lvl4pPr eaLnBrk="1" hangingPunct="1">
-              <a:defRPr>
-                <a:solidFill>
-                  <a:schemeClr val="tx2"/>
-                </a:solidFill>
-              </a:defRPr>
-            </a:lvl4pPr>
-            <a:lvl5pPr eaLnBrk="1" hangingPunct="1">
-              <a:defRPr>
-                <a:solidFill>
-                  <a:schemeClr val="tx2"/>
-                </a:solidFill>
-              </a:defRPr>
-            </a:lvl5pPr>
-            <a:lvl6pPr eaLnBrk="1" hangingPunct="1">
-              <a:defRPr>
-                <a:solidFill>
-                  <a:schemeClr val="tx2"/>
-                </a:solidFill>
-              </a:defRPr>
-            </a:lvl6pPr>
-            <a:lvl7pPr eaLnBrk="1" hangingPunct="1">
-              <a:defRPr>
-                <a:solidFill>
-                  <a:schemeClr val="tx2"/>
-                </a:solidFill>
-              </a:defRPr>
-            </a:lvl7pPr>
-            <a:lvl8pPr eaLnBrk="1" hangingPunct="1">
-              <a:defRPr>
-                <a:solidFill>
-                  <a:schemeClr val="tx2"/>
-                </a:solidFill>
-              </a:defRPr>
-            </a:lvl8pPr>
-            <a:lvl9pPr eaLnBrk="1" hangingPunct="1">
-              <a:defRPr>
-                <a:solidFill>
-                  <a:schemeClr val="tx2"/>
-                </a:solidFill>
-              </a:defRPr>
-            </a:lvl9pPr>
-          </a:lstStyle>
-          <a:p>
-            <a:r>
-              <a:rPr lang="es-MX" sz="2000" dirty="0">
-                <a:solidFill>
-                  <a:srgbClr val="FF0000"/>
-                </a:solidFill>
-              </a:rPr>
-              <a:t>Oscar: </a:t>
-            </a:r>
-            <a:r>
-              <a:rPr lang="es-MX" sz="2000" dirty="0"/>
-              <a:t>Dani falta la información</a:t>
+              <a:rPr lang="es-ES_tradnl" b="1" dirty="0"/>
+              <a:t>Buscar una mejor relación costo-beneficio de los sistemas automáticos o computarizados diseñados e implantados por el PAD</a:t>
             </a:r>
           </a:p>
           <a:p>
-            <a:endParaRPr lang="es-MX" sz="2000" dirty="0" smtClean="0">
-              <a:solidFill>
-                <a:srgbClr val="FF0000"/>
-              </a:solidFill>
-            </a:endParaRPr>
-          </a:p>
-          <a:p>
+            <a:pPr lvl="0"/>
             <a:r>
-              <a:rPr lang="es-MX" sz="2000" dirty="0" smtClean="0">
-                <a:solidFill>
-                  <a:srgbClr val="FF0000"/>
-                </a:solidFill>
-              </a:rPr>
-              <a:t>Manuel: </a:t>
-            </a:r>
-            <a:r>
-              <a:rPr lang="es-MX" sz="2000" dirty="0" smtClean="0"/>
-              <a:t>se acaba el tiempo (domingo 10:40)</a:t>
+              <a:rPr lang="es-MX" b="1" dirty="0"/>
+              <a:t>Incrementar la satisfacción de los usuarios de los sistemas computarizados  </a:t>
             </a:r>
           </a:p>
           <a:p>
-            <a:endParaRPr lang="es-MX" sz="2000" dirty="0" smtClean="0"/>
-          </a:p>
-          <a:p>
+            <a:pPr lvl="0"/>
             <a:r>
-              <a:rPr lang="es-MX" sz="2000" dirty="0" err="1">
-                <a:solidFill>
-                  <a:srgbClr val="FF0000"/>
-                </a:solidFill>
-              </a:rPr>
-              <a:t>jonathan</a:t>
-            </a:r>
-            <a:r>
-              <a:rPr lang="es-MX" sz="2000" dirty="0" smtClean="0">
-                <a:solidFill>
-                  <a:srgbClr val="FF0000"/>
-                </a:solidFill>
-              </a:rPr>
-              <a:t>: ¿</a:t>
-            </a:r>
-            <a:r>
-              <a:rPr lang="es-MX" sz="2000" dirty="0" smtClean="0"/>
-              <a:t>que </a:t>
-            </a:r>
-            <a:r>
-              <a:rPr lang="es-MX" sz="2000" dirty="0"/>
-              <a:t>pasa </a:t>
-            </a:r>
-            <a:r>
-              <a:rPr lang="es-MX" sz="2000" dirty="0" err="1" smtClean="0"/>
-              <a:t>dany</a:t>
-            </a:r>
-            <a:r>
-              <a:rPr lang="es-MX" sz="2000" smtClean="0"/>
-              <a:t>?.</a:t>
-            </a:r>
-            <a:endParaRPr lang="es-MX" sz="2000" dirty="0"/>
-          </a:p>
-          <a:p>
-            <a:r>
-              <a:rPr lang="es-MX" sz="2000" dirty="0" smtClean="0">
-                <a:solidFill>
-                  <a:srgbClr val="FF0000"/>
-                </a:solidFill>
-              </a:rPr>
-              <a:t>David: </a:t>
-            </a:r>
-            <a:r>
-              <a:rPr lang="es-MX" sz="2000" dirty="0" smtClean="0"/>
-              <a:t>falta mas información.</a:t>
+              <a:rPr lang="es-MX" b="1" dirty="0"/>
+              <a:t>     Asegurar una mayor integridad, confidencialidad y confiabilidad de la información mediante la      recomendación de seguridades y controles. </a:t>
             </a:r>
           </a:p>
           <a:p>
             <a:r>
-              <a:rPr lang="es-MX" sz="2000" b="1" dirty="0" smtClean="0">
-                <a:solidFill>
-                  <a:srgbClr val="FF0000"/>
-                </a:solidFill>
-              </a:rPr>
-              <a:t>Vicente:</a:t>
+              <a:rPr lang="es-ES_tradnl" b="1" dirty="0"/>
+              <a:t>Conocer la situación actual del área informática y las actividades y esfuerzos necesarios para lograr los objetivos propuestos.</a:t>
             </a:r>
-            <a:r>
-              <a:rPr lang="es-MX" sz="2000" dirty="0" smtClean="0"/>
-              <a:t> Falta algo de </a:t>
-            </a:r>
-            <a:r>
-              <a:rPr lang="es-MX" sz="2000" dirty="0" err="1" smtClean="0"/>
-              <a:t>Informacion</a:t>
-            </a:r>
-            <a:r>
-              <a:rPr lang="es-MX" sz="2000" dirty="0" smtClean="0"/>
-              <a:t> mi DANNY.</a:t>
-            </a:r>
-            <a:endParaRPr lang="es-MX" sz="2000" dirty="0"/>
           </a:p>
           <a:p>
-            <a:endParaRPr lang="es-MX" sz="2000" dirty="0"/>
+            <a:endParaRPr lang="es-MX" dirty="0"/>
           </a:p>
         </p:txBody>
       </p:sp>
     </p:spTree>
     <p:extLst>
       <p:ext uri="{BB962C8B-B14F-4D97-AF65-F5344CB8AC3E}">
-        <p14:creationId xmlns:p14="http://schemas.microsoft.com/office/powerpoint/2010/main" val="1534762223"/>
+        <p14:creationId xmlns:p14="http://schemas.microsoft.com/office/powerpoint/2010/main" val="3540103819"/>
+      </p:ext>
+    </p:extLst>
+  </p:cSld>
+  <p:clrMapOvr>
+    <a:masterClrMapping/>
+  </p:clrMapOvr>
+</p:sld>
+</file>
+
+<file path=ppt/slides/slide5.xml><?xml version="1.0" encoding="utf-8"?>
+<p:sld xmlns:a="http://schemas.openxmlformats.org/drawingml/2006/main" xmlns:r="http://schemas.openxmlformats.org/officeDocument/2006/relationships" xmlns:p="http://schemas.openxmlformats.org/presentationml/2006/main">
+  <p:cSld>
+    <p:spTree>
+      <p:nvGrpSpPr>
+        <p:cNvPr id="1" name=""/>
+        <p:cNvGrpSpPr/>
+        <p:nvPr/>
+      </p:nvGrpSpPr>
+      <p:grpSpPr>
+        <a:xfrm>
+          <a:off x="0" y="0"/>
+          <a:ext cx="0" cy="0"/>
+          <a:chOff x="0" y="0"/>
+          <a:chExt cx="0" cy="0"/>
+        </a:xfrm>
+      </p:grpSpPr>
+      <p:sp>
+        <p:nvSpPr>
+          <p:cNvPr id="2" name="1 CuadroTexto"/>
+          <p:cNvSpPr txBox="1"/>
+          <p:nvPr/>
+        </p:nvSpPr>
+        <p:spPr>
+          <a:xfrm>
+            <a:off x="1043608" y="1772816"/>
+            <a:ext cx="7200800" cy="3416320"/>
+          </a:xfrm>
+          <a:prstGeom prst="rect">
+            <a:avLst/>
+          </a:prstGeom>
+          <a:noFill/>
+        </p:spPr>
+        <p:txBody>
+          <a:bodyPr wrap="square" rtlCol="0">
+            <a:spAutoFit/>
+          </a:bodyPr>
+          <a:lstStyle/>
+          <a:p>
+            <a:r>
+              <a:rPr lang="es-ES_tradnl" b="1" dirty="0"/>
+              <a:t>Seguridad de personal, datos, hardware, software e instalaciones.</a:t>
+            </a:r>
+          </a:p>
+          <a:p>
+            <a:r>
+              <a:rPr lang="es-ES_tradnl" b="1" dirty="0"/>
+              <a:t>Apoyo de función informática a las metas y objetivos de la organización.</a:t>
+            </a:r>
+          </a:p>
+          <a:p>
+            <a:r>
+              <a:rPr lang="es-MX" dirty="0"/>
+              <a:t> </a:t>
+            </a:r>
+            <a:r>
+              <a:rPr lang="es-MX" b="1" dirty="0"/>
+              <a:t>Seguridad, utilidad, confianza, privacidad y disponibilidad en el ambiente informático. </a:t>
+            </a:r>
+            <a:br>
+              <a:rPr lang="es-MX" b="1" dirty="0"/>
+            </a:br>
+            <a:r>
+              <a:rPr lang="es-ES_tradnl" b="1" dirty="0"/>
+              <a:t>Minimizar existencias de riesgos en el uso de Tecnología de información.</a:t>
+            </a:r>
+          </a:p>
+          <a:p>
+            <a:r>
+              <a:rPr lang="es-ES_tradnl" b="1" dirty="0"/>
+              <a:t>Decisiones de inversión y gastos innecesarios.</a:t>
+            </a:r>
+          </a:p>
+          <a:p>
+            <a:pPr lvl="0"/>
+            <a:r>
+              <a:rPr lang="es-MX" b="1" dirty="0"/>
+              <a:t>Capacitación y educación sobre controles en los Sistemas de Información.  </a:t>
+            </a:r>
+          </a:p>
+          <a:p>
+            <a:endParaRPr lang="es-MX" dirty="0"/>
+          </a:p>
+        </p:txBody>
+      </p:sp>
+    </p:spTree>
+    <p:extLst>
+      <p:ext uri="{BB962C8B-B14F-4D97-AF65-F5344CB8AC3E}">
+        <p14:creationId xmlns:p14="http://schemas.microsoft.com/office/powerpoint/2010/main" val="2051061234"/>
       </p:ext>
     </p:extLst>
   </p:cSld>

</xml_diff>

<commit_message>
Comentarios en archivo La auditoria en informática y su entorno
</commit_message>
<xml_diff>
--- a/La auditoria en informática y su entorno.pptx
+++ b/La auditoria en informática y su entorno.pptx
@@ -10,6 +10,7 @@
     <p:sldId id="258" r:id="rId4"/>
     <p:sldId id="261" r:id="rId5"/>
     <p:sldId id="260" r:id="rId6"/>
+    <p:sldId id="262" r:id="rId7"/>
   </p:sldIdLst>
   <p:sldSz cx="9144000" cy="6858000" type="screen4x3"/>
   <p:notesSz cx="6858000" cy="9144000"/>
@@ -108,6 +109,22 @@
       </a:defRPr>
     </a:lvl9pPr>
   </p:defaultTextStyle>
+  <p:extLst>
+    <p:ext uri="{EFAFB233-063F-42B5-8137-9DF3F51BA10A}">
+      <p15:sldGuideLst xmlns:p15="http://schemas.microsoft.com/office/powerpoint/2012/main">
+        <p15:guide id="1" orient="horz" pos="2160">
+          <p15:clr>
+            <a:srgbClr val="A4A3A4"/>
+          </p15:clr>
+        </p15:guide>
+        <p15:guide id="2" pos="2880">
+          <p15:clr>
+            <a:srgbClr val="A4A3A4"/>
+          </p15:clr>
+        </p15:guide>
+      </p15:sldGuideLst>
+    </p:ext>
+  </p:extLst>
 </p:presentation>
 </file>
 
@@ -13834,6 +13851,13 @@
   <p:clrMapOvr>
     <a:masterClrMapping/>
   </p:clrMapOvr>
+  <p:timing>
+    <p:tnLst>
+      <p:par>
+        <p:cTn id="1" dur="indefinite" restart="never" nodeType="tmRoot"/>
+      </p:par>
+    </p:tnLst>
+  </p:timing>
 </p:sld>
 </file>
 
@@ -13890,7 +13914,7 @@
         <p:spPr/>
         <p:txBody>
           <a:bodyPr>
-            <a:normAutofit fontScale="70000" lnSpcReduction="20000"/>
+            <a:normAutofit fontScale="62500" lnSpcReduction="20000"/>
           </a:bodyPr>
           <a:lstStyle/>
           <a:p>
@@ -13940,6 +13964,13 @@
   <p:clrMapOvr>
     <a:masterClrMapping/>
   </p:clrMapOvr>
+  <p:timing>
+    <p:tnLst>
+      <p:par>
+        <p:cTn id="1" dur="indefinite" restart="never" nodeType="tmRoot"/>
+      </p:par>
+    </p:tnLst>
+  </p:timing>
 </p:sld>
 </file>
 
@@ -14040,6 +14071,13 @@
   <p:clrMapOvr>
     <a:masterClrMapping/>
   </p:clrMapOvr>
+  <p:timing>
+    <p:tnLst>
+      <p:par>
+        <p:cTn id="1" dur="indefinite" restart="never" nodeType="tmRoot"/>
+      </p:par>
+    </p:tnLst>
+  </p:timing>
 </p:sld>
 </file>
 
@@ -14098,7 +14136,7 @@
         <p:spPr/>
         <p:txBody>
           <a:bodyPr>
-            <a:normAutofit fontScale="85000" lnSpcReduction="10000"/>
+            <a:normAutofit fontScale="85000" lnSpcReduction="20000"/>
           </a:bodyPr>
           <a:lstStyle/>
           <a:p>
@@ -14142,6 +14180,13 @@
   <p:clrMapOvr>
     <a:masterClrMapping/>
   </p:clrMapOvr>
+  <p:timing>
+    <p:tnLst>
+      <p:par>
+        <p:cTn id="1" dur="indefinite" restart="never" nodeType="tmRoot"/>
+      </p:par>
+    </p:tnLst>
+  </p:timing>
 </p:sld>
 </file>
 
@@ -14240,6 +14285,168 @@
   <p:clrMapOvr>
     <a:masterClrMapping/>
   </p:clrMapOvr>
+  <p:timing>
+    <p:tnLst>
+      <p:par>
+        <p:cTn id="1" dur="indefinite" restart="never" nodeType="tmRoot"/>
+      </p:par>
+    </p:tnLst>
+  </p:timing>
+</p:sld>
+</file>
+
+<file path=ppt/slides/slide6.xml><?xml version="1.0" encoding="utf-8"?>
+<p:sld xmlns:a="http://schemas.openxmlformats.org/drawingml/2006/main" xmlns:r="http://schemas.openxmlformats.org/officeDocument/2006/relationships" xmlns:p="http://schemas.openxmlformats.org/presentationml/2006/main">
+  <p:cSld>
+    <p:spTree>
+      <p:nvGrpSpPr>
+        <p:cNvPr id="1" name=""/>
+        <p:cNvGrpSpPr/>
+        <p:nvPr/>
+      </p:nvGrpSpPr>
+      <p:grpSpPr>
+        <a:xfrm>
+          <a:off x="0" y="0"/>
+          <a:ext cx="0" cy="0"/>
+          <a:chOff x="0" y="0"/>
+          <a:chExt cx="0" cy="0"/>
+        </a:xfrm>
+      </p:grpSpPr>
+      <p:sp>
+        <p:nvSpPr>
+          <p:cNvPr id="2" name="CuadroTexto 1"/>
+          <p:cNvSpPr txBox="1"/>
+          <p:nvPr/>
+        </p:nvSpPr>
+        <p:spPr>
+          <a:xfrm>
+            <a:off x="971600" y="1340768"/>
+            <a:ext cx="5760640" cy="646331"/>
+          </a:xfrm>
+          <a:prstGeom prst="rect">
+            <a:avLst/>
+          </a:prstGeom>
+          <a:noFill/>
+        </p:spPr>
+        <p:txBody>
+          <a:bodyPr wrap="square" rtlCol="0">
+            <a:spAutoFit/>
+          </a:bodyPr>
+          <a:lstStyle/>
+          <a:p>
+            <a:r>
+              <a:rPr lang="en-US" b="1" dirty="0" smtClean="0">
+                <a:solidFill>
+                  <a:srgbClr val="FF0000"/>
+                </a:solidFill>
+              </a:rPr>
+              <a:t>Javier </a:t>
+            </a:r>
+            <a:r>
+              <a:rPr lang="en-US" b="1" dirty="0" err="1" smtClean="0">
+                <a:solidFill>
+                  <a:srgbClr val="FF0000"/>
+                </a:solidFill>
+              </a:rPr>
+              <a:t>Lizárraga</a:t>
+            </a:r>
+            <a:r>
+              <a:rPr lang="en-US" b="1" dirty="0" smtClean="0">
+                <a:solidFill>
+                  <a:srgbClr val="FF0000"/>
+                </a:solidFill>
+              </a:rPr>
+              <a:t>: </a:t>
+            </a:r>
+            <a:r>
+              <a:rPr lang="en-US" dirty="0" err="1" smtClean="0"/>
+              <a:t>Muy</a:t>
+            </a:r>
+            <a:r>
+              <a:rPr lang="en-US" dirty="0" smtClean="0"/>
+              <a:t> </a:t>
+            </a:r>
+            <a:r>
+              <a:rPr lang="en-US" dirty="0" err="1" smtClean="0"/>
+              <a:t>interesante</a:t>
+            </a:r>
+            <a:r>
+              <a:rPr lang="en-US" dirty="0" smtClean="0"/>
+              <a:t> el </a:t>
+            </a:r>
+            <a:r>
+              <a:rPr lang="en-US" dirty="0" err="1" smtClean="0"/>
+              <a:t>tema</a:t>
+            </a:r>
+            <a:r>
+              <a:rPr lang="en-US" dirty="0" smtClean="0"/>
+              <a:t>, mucho </a:t>
+            </a:r>
+            <a:r>
+              <a:rPr lang="en-US" dirty="0" err="1" smtClean="0"/>
+              <a:t>por</a:t>
+            </a:r>
+            <a:r>
+              <a:rPr lang="en-US" dirty="0" smtClean="0"/>
+              <a:t> </a:t>
+            </a:r>
+            <a:r>
+              <a:rPr lang="en-US" dirty="0" err="1" smtClean="0"/>
+              <a:t>aprender</a:t>
+            </a:r>
+            <a:r>
+              <a:rPr lang="en-US" dirty="0" smtClean="0"/>
+              <a:t>, no solo </a:t>
+            </a:r>
+            <a:r>
+              <a:rPr lang="en-US" dirty="0" err="1" smtClean="0"/>
+              <a:t>es</a:t>
+            </a:r>
+            <a:r>
+              <a:rPr lang="en-US" dirty="0" smtClean="0"/>
+              <a:t> </a:t>
+            </a:r>
+            <a:r>
+              <a:rPr lang="en-US" dirty="0" err="1" smtClean="0"/>
+              <a:t>desarrollar</a:t>
+            </a:r>
+            <a:r>
+              <a:rPr lang="en-US" dirty="0" smtClean="0"/>
+              <a:t> </a:t>
+            </a:r>
+            <a:r>
+              <a:rPr lang="en-US" dirty="0" err="1" smtClean="0"/>
+              <a:t>aplicaciones</a:t>
+            </a:r>
+            <a:r>
+              <a:rPr lang="en-US" dirty="0" smtClean="0"/>
+              <a:t>.</a:t>
+            </a:r>
+            <a:endParaRPr lang="en-US" dirty="0">
+              <a:solidFill>
+                <a:srgbClr val="FF0000"/>
+              </a:solidFill>
+            </a:endParaRPr>
+          </a:p>
+        </p:txBody>
+      </p:sp>
+    </p:spTree>
+    <p:extLst>
+      <p:ext uri="{BB962C8B-B14F-4D97-AF65-F5344CB8AC3E}">
+        <p14:creationId xmlns:p14="http://schemas.microsoft.com/office/powerpoint/2010/main" val="1607319872"/>
+      </p:ext>
+    </p:extLst>
+  </p:cSld>
+  <p:clrMapOvr>
+    <a:masterClrMapping/>
+  </p:clrMapOvr>
+  <p:timing>
+    <p:tnLst>
+      <p:par>
+        <p:cTn id="1" dur="indefinite" restart="never" nodeType="tmRoot"/>
+      </p:par>
+    </p:tnLst>
+  </p:timing>
 </p:sld>
 </file>
 

</xml_diff>